<commit_message>
Updated term project rubric
</commit_message>
<xml_diff>
--- a/NotesAndSlides/CIS399Wk3Day1-HandlingData.pptx
+++ b/NotesAndSlides/CIS399Wk3Day1-HandlingData.pptx
@@ -246,7 +246,7 @@
           <a:p>
             <a:fld id="{1FC32AA1-1225-9048-80C3-2B6F58548154}" type="datetimeFigureOut">
               <a:rPr lang="en-US" smtClean="0"/>
-              <a:t>6/28/18</a:t>
+              <a:t>7/16/18</a:t>
             </a:fld>
             <a:endParaRPr lang="en-US"/>
           </a:p>
@@ -1266,6 +1266,12 @@
             </a:r>
             <a:endParaRPr lang="en-US" dirty="0"/>
           </a:p>
+          <a:p>
+            <a:r>
+              <a:rPr lang="en-US" dirty="0"/>
+              <a:t>… is used to declare an array of optional parameters</a:t>
+            </a:r>
+          </a:p>
         </p:txBody>
       </p:sp>
       <p:sp>
@@ -1483,7 +1489,7 @@
           <a:p>
             <a:fld id="{12110144-19AD-4D4E-902D-E18AF93089D3}" type="datetimeFigureOut">
               <a:rPr lang="en-US" smtClean="0"/>
-              <a:t>6/28/18</a:t>
+              <a:t>7/16/18</a:t>
             </a:fld>
             <a:endParaRPr lang="en-US"/>
           </a:p>
@@ -1651,7 +1657,7 @@
           <a:p>
             <a:fld id="{12110144-19AD-4D4E-902D-E18AF93089D3}" type="datetimeFigureOut">
               <a:rPr lang="en-US" smtClean="0"/>
-              <a:t>6/28/18</a:t>
+              <a:t>7/16/18</a:t>
             </a:fld>
             <a:endParaRPr lang="en-US"/>
           </a:p>
@@ -1829,7 +1835,7 @@
           <a:p>
             <a:fld id="{12110144-19AD-4D4E-902D-E18AF93089D3}" type="datetimeFigureOut">
               <a:rPr lang="en-US" smtClean="0"/>
-              <a:t>6/28/18</a:t>
+              <a:t>7/16/18</a:t>
             </a:fld>
             <a:endParaRPr lang="en-US"/>
           </a:p>
@@ -1997,7 +2003,7 @@
           <a:p>
             <a:fld id="{12110144-19AD-4D4E-902D-E18AF93089D3}" type="datetimeFigureOut">
               <a:rPr lang="en-US" smtClean="0"/>
-              <a:t>6/28/18</a:t>
+              <a:t>7/16/18</a:t>
             </a:fld>
             <a:endParaRPr lang="en-US"/>
           </a:p>
@@ -2242,7 +2248,7 @@
           <a:p>
             <a:fld id="{12110144-19AD-4D4E-902D-E18AF93089D3}" type="datetimeFigureOut">
               <a:rPr lang="en-US" smtClean="0"/>
-              <a:t>6/28/18</a:t>
+              <a:t>7/16/18</a:t>
             </a:fld>
             <a:endParaRPr lang="en-US"/>
           </a:p>
@@ -2527,7 +2533,7 @@
           <a:p>
             <a:fld id="{12110144-19AD-4D4E-902D-E18AF93089D3}" type="datetimeFigureOut">
               <a:rPr lang="en-US" smtClean="0"/>
-              <a:t>6/28/18</a:t>
+              <a:t>7/16/18</a:t>
             </a:fld>
             <a:endParaRPr lang="en-US"/>
           </a:p>
@@ -2946,7 +2952,7 @@
           <a:p>
             <a:fld id="{12110144-19AD-4D4E-902D-E18AF93089D3}" type="datetimeFigureOut">
               <a:rPr lang="en-US" smtClean="0"/>
-              <a:t>6/28/18</a:t>
+              <a:t>7/16/18</a:t>
             </a:fld>
             <a:endParaRPr lang="en-US"/>
           </a:p>
@@ -3063,7 +3069,7 @@
           <a:p>
             <a:fld id="{12110144-19AD-4D4E-902D-E18AF93089D3}" type="datetimeFigureOut">
               <a:rPr lang="en-US" smtClean="0"/>
-              <a:t>6/28/18</a:t>
+              <a:t>7/16/18</a:t>
             </a:fld>
             <a:endParaRPr lang="en-US"/>
           </a:p>
@@ -3158,7 +3164,7 @@
           <a:p>
             <a:fld id="{12110144-19AD-4D4E-902D-E18AF93089D3}" type="datetimeFigureOut">
               <a:rPr lang="en-US" smtClean="0"/>
-              <a:t>6/28/18</a:t>
+              <a:t>7/16/18</a:t>
             </a:fld>
             <a:endParaRPr lang="en-US"/>
           </a:p>
@@ -3433,7 +3439,7 @@
           <a:p>
             <a:fld id="{12110144-19AD-4D4E-902D-E18AF93089D3}" type="datetimeFigureOut">
               <a:rPr lang="en-US" smtClean="0"/>
-              <a:t>6/28/18</a:t>
+              <a:t>7/16/18</a:t>
             </a:fld>
             <a:endParaRPr lang="en-US"/>
           </a:p>
@@ -3685,7 +3691,7 @@
           <a:p>
             <a:fld id="{12110144-19AD-4D4E-902D-E18AF93089D3}" type="datetimeFigureOut">
               <a:rPr lang="en-US" smtClean="0"/>
-              <a:t>6/28/18</a:t>
+              <a:t>7/16/18</a:t>
             </a:fld>
             <a:endParaRPr lang="en-US"/>
           </a:p>
@@ -3914,7 +3920,7 @@
           <a:p>
             <a:fld id="{12110144-19AD-4D4E-902D-E18AF93089D3}" type="datetimeFigureOut">
               <a:rPr lang="en-US" smtClean="0"/>
-              <a:t>6/28/18</a:t>
+              <a:t>7/16/18</a:t>
             </a:fld>
             <a:endParaRPr lang="en-US"/>
           </a:p>
@@ -4909,7 +4915,7 @@
           <a:graphicData uri="http://schemas.openxmlformats.org/presentationml/2006/ole">
             <mc:AlternateContent xmlns:mc="http://schemas.openxmlformats.org/markup-compatibility/2006">
               <mc:Choice xmlns:v="urn:schemas-microsoft-com:vml" Requires="v">
-                <p:oleObj spid="_x0000_s1046" name="Document" r:id="rId3" imgW="7404100" imgH="3644900" progId="Word.Document.12">
+                <p:oleObj spid="_x0000_s1052" name="Document" r:id="rId3" imgW="7404100" imgH="3644900" progId="Word.Document.12">
                   <p:embed/>
                 </p:oleObj>
               </mc:Choice>
@@ -5541,7 +5547,7 @@
           <a:graphicData uri="http://schemas.openxmlformats.org/presentationml/2006/ole">
             <mc:AlternateContent xmlns:mc="http://schemas.openxmlformats.org/markup-compatibility/2006">
               <mc:Choice xmlns:v="urn:schemas-microsoft-com:vml" Requires="v">
-                <p:oleObj spid="_x0000_s7190" name="Document" r:id="rId3" imgW="7518400" imgH="5257800" progId="Word.Document.12">
+                <p:oleObj spid="_x0000_s7196" name="Document" r:id="rId3" imgW="7518400" imgH="5257800" progId="Word.Document.12">
                   <p:embed/>
                 </p:oleObj>
               </mc:Choice>
@@ -5655,7 +5661,7 @@
                   <a:srgbClr val="0000FF"/>
                 </a:solidFill>
               </a:rPr>
-              <a:t>Exercise: Android Device Monitor</a:t>
+              <a:t>Exercise: Device File Explorer</a:t>
             </a:r>
           </a:p>
         </p:txBody>
@@ -5716,7 +5722,7 @@
             </a:r>
             <a:r>
               <a:rPr lang="en-US" i="1" dirty="0"/>
-              <a:t>Tools</a:t>
+              <a:t>View</a:t>
             </a:r>
             <a:r>
               <a:rPr lang="en-US" dirty="0"/>
@@ -5724,7 +5730,7 @@
             </a:r>
             <a:r>
               <a:rPr lang="en-US" i="1" dirty="0"/>
-              <a:t>Android</a:t>
+              <a:t>Tool Windows</a:t>
             </a:r>
             <a:r>
               <a:rPr lang="en-US" dirty="0"/>
@@ -5732,7 +5738,7 @@
             </a:r>
             <a:r>
               <a:rPr lang="en-US" i="1" dirty="0"/>
-              <a:t>Android Device Monitor</a:t>
+              <a:t>Device File Explorer</a:t>
             </a:r>
           </a:p>
           <a:p>
@@ -5745,7 +5751,13 @@
       </p:sp>
       <p:pic>
         <p:nvPicPr>
-          <p:cNvPr id="4" name="Picture 3"/>
+          <p:cNvPr id="5" name="Picture 4">
+            <a:extLst>
+              <a:ext uri="{FF2B5EF4-FFF2-40B4-BE49-F238E27FC236}">
+                <a16:creationId xmlns:a16="http://schemas.microsoft.com/office/drawing/2014/main" id="{60CED80B-1DE8-5349-888D-CC112E7E05CE}"/>
+              </a:ext>
+            </a:extLst>
+          </p:cNvPr>
           <p:cNvPicPr>
             <a:picLocks noChangeAspect="1"/>
           </p:cNvPicPr>
@@ -5759,8 +5771,8 @@
         </p:blipFill>
         <p:spPr>
           <a:xfrm>
-            <a:off x="1930400" y="3870960"/>
-            <a:ext cx="4406900" cy="2644140"/>
+            <a:off x="3200630" y="3907162"/>
+            <a:ext cx="2324100" cy="2260600"/>
           </a:xfrm>
           <a:prstGeom prst="rect">
             <a:avLst/>
@@ -5848,7 +5860,7 @@
                   <a:srgbClr val="0000FF"/>
                 </a:solidFill>
               </a:rPr>
-              <a:t>Exercise: Android Device Monitor</a:t>
+              <a:t>Exercise: Device File Explorer</a:t>
             </a:r>
             <a:br>
               <a:rPr lang="en-US" dirty="0">
@@ -5906,15 +5918,19 @@
             </a:pPr>
             <a:r>
               <a:rPr lang="en-US" dirty="0"/>
-              <a:t>In Android Device Monitor, select the </a:t>
+              <a:t>In Device File Explorer, open the path</a:t>
             </a:r>
             <a:r>
               <a:rPr lang="en-US" i="1" dirty="0"/>
-              <a:t>File Explorer</a:t>
-            </a:r>
-            <a:r>
-              <a:rPr lang="en-US" dirty="0"/>
-              <a:t> tab</a:t>
+              <a:t>: data/data/</a:t>
+            </a:r>
+            <a:r>
+              <a:rPr lang="en-US" i="1" dirty="0" err="1"/>
+              <a:t>com.murach.newsreader</a:t>
+            </a:r>
+            <a:r>
+              <a:rPr lang="en-US" i="1" dirty="0"/>
+              <a:t>/files/</a:t>
             </a:r>
           </a:p>
           <a:p>
@@ -5924,28 +5940,6 @@
             </a:pPr>
             <a:r>
               <a:rPr lang="en-US" dirty="0"/>
-              <a:t>Open the path</a:t>
-            </a:r>
-            <a:r>
-              <a:rPr lang="en-US" i="1" dirty="0"/>
-              <a:t>: data/data/</a:t>
-            </a:r>
-            <a:r>
-              <a:rPr lang="en-US" i="1" dirty="0" err="1"/>
-              <a:t>com.murach.newsreader</a:t>
-            </a:r>
-            <a:r>
-              <a:rPr lang="en-US" i="1" dirty="0"/>
-              <a:t>/files/</a:t>
-            </a:r>
-          </a:p>
-          <a:p>
-            <a:pPr marL="914400" lvl="1" indent="-514350">
-              <a:buFont typeface="+mj-lt"/>
-              <a:buAutoNum type="alphaLcPeriod"/>
-            </a:pPr>
-            <a:r>
-              <a:rPr lang="en-US" dirty="0"/>
               <a:t>Select </a:t>
             </a:r>
             <a:r>
@@ -5961,15 +5955,7 @@
             </a:pPr>
             <a:r>
               <a:rPr lang="en-US" dirty="0"/>
-              <a:t>Click on the </a:t>
-            </a:r>
-            <a:r>
-              <a:rPr lang="en-US" i="1" dirty="0"/>
-              <a:t>Pull a file from the device </a:t>
-            </a:r>
-            <a:r>
-              <a:rPr lang="en-US" dirty="0"/>
-              <a:t>button</a:t>
+              <a:t>Right-click on the file and select “save as”, then select a location on your computer for the file.</a:t>
             </a:r>
           </a:p>
           <a:p>
@@ -6361,7 +6347,7 @@
           <a:graphicData uri="http://schemas.openxmlformats.org/presentationml/2006/ole">
             <mc:AlternateContent xmlns:mc="http://schemas.openxmlformats.org/markup-compatibility/2006">
               <mc:Choice xmlns:v="urn:schemas-microsoft-com:vml" Requires="v">
-                <p:oleObj spid="_x0000_s8214" name="Document" r:id="rId3" imgW="6959600" imgH="5003800" progId="Word.Document.12">
+                <p:oleObj spid="_x0000_s8220" name="Document" r:id="rId3" imgW="6959600" imgH="5003800" progId="Word.Document.12">
                   <p:embed/>
                 </p:oleObj>
               </mc:Choice>
@@ -6558,7 +6544,7 @@
           <a:graphicData uri="http://schemas.openxmlformats.org/presentationml/2006/ole">
             <mc:AlternateContent xmlns:mc="http://schemas.openxmlformats.org/markup-compatibility/2006">
               <mc:Choice xmlns:v="urn:schemas-microsoft-com:vml" Requires="v">
-                <p:oleObj spid="_x0000_s9236" name="Document" r:id="rId3" imgW="7385143" imgH="5153726" progId="Word.Document.12">
+                <p:oleObj spid="_x0000_s9242" name="Document" r:id="rId3" imgW="7385143" imgH="5153726" progId="Word.Document.12">
                   <p:embed/>
                 </p:oleObj>
               </mc:Choice>
@@ -6755,7 +6741,7 @@
           <a:graphicData uri="http://schemas.openxmlformats.org/presentationml/2006/ole">
             <mc:AlternateContent xmlns:mc="http://schemas.openxmlformats.org/markup-compatibility/2006">
               <mc:Choice xmlns:v="urn:schemas-microsoft-com:vml" Requires="v">
-                <p:oleObj spid="_x0000_s10260" name="Document" r:id="rId3" imgW="7309115" imgH="4326518" progId="Word.Document.12">
+                <p:oleObj spid="_x0000_s10266" name="Document" r:id="rId3" imgW="7309115" imgH="4326518" progId="Word.Document.12">
                   <p:embed/>
                 </p:oleObj>
               </mc:Choice>
@@ -7871,7 +7857,7 @@
           <a:graphicData uri="http://schemas.openxmlformats.org/presentationml/2006/ole">
             <mc:AlternateContent xmlns:mc="http://schemas.openxmlformats.org/markup-compatibility/2006">
               <mc:Choice xmlns:v="urn:schemas-microsoft-com:vml" Requires="v">
-                <p:oleObj spid="_x0000_s11284" name="Document" r:id="rId3" imgW="6864119" imgH="4678614" progId="Word.Document.12">
+                <p:oleObj spid="_x0000_s11290" name="Document" r:id="rId3" imgW="6864119" imgH="4678614" progId="Word.Document.12">
                   <p:embed/>
                 </p:oleObj>
               </mc:Choice>
@@ -8068,7 +8054,7 @@
           <a:graphicData uri="http://schemas.openxmlformats.org/presentationml/2006/ole">
             <mc:AlternateContent xmlns:mc="http://schemas.openxmlformats.org/markup-compatibility/2006">
               <mc:Choice xmlns:v="urn:schemas-microsoft-com:vml" Requires="v">
-                <p:oleObj spid="_x0000_s12308" name="Document" r:id="rId3" imgW="6864119" imgH="2858612" progId="Word.Document.12">
+                <p:oleObj spid="_x0000_s12314" name="Document" r:id="rId3" imgW="6864119" imgH="2858612" progId="Word.Document.12">
                   <p:embed/>
                 </p:oleObj>
               </mc:Choice>
@@ -8265,7 +8251,7 @@
           <a:graphicData uri="http://schemas.openxmlformats.org/presentationml/2006/ole">
             <mc:AlternateContent xmlns:mc="http://schemas.openxmlformats.org/markup-compatibility/2006">
               <mc:Choice xmlns:v="urn:schemas-microsoft-com:vml" Requires="v">
-                <p:oleObj spid="_x0000_s13333" name="Document" r:id="rId3" imgW="6858000" imgH="4610100" progId="Word.Document.12">
+                <p:oleObj spid="_x0000_s13339" name="Document" r:id="rId3" imgW="6858000" imgH="4610100" progId="Word.Document.12">
                   <p:embed/>
                 </p:oleObj>
               </mc:Choice>
@@ -8462,7 +8448,7 @@
           <a:graphicData uri="http://schemas.openxmlformats.org/presentationml/2006/ole">
             <mc:AlternateContent xmlns:mc="http://schemas.openxmlformats.org/markup-compatibility/2006">
               <mc:Choice xmlns:v="urn:schemas-microsoft-com:vml" Requires="v">
-                <p:oleObj spid="_x0000_s14356" name="Document" r:id="rId3" imgW="6864119" imgH="4880636" progId="Word.Document.12">
+                <p:oleObj spid="_x0000_s14362" name="Document" r:id="rId3" imgW="6864119" imgH="4880636" progId="Word.Document.12">
                   <p:embed/>
                 </p:oleObj>
               </mc:Choice>
@@ -8659,7 +8645,7 @@
           <a:graphicData uri="http://schemas.openxmlformats.org/presentationml/2006/ole">
             <mc:AlternateContent xmlns:mc="http://schemas.openxmlformats.org/markup-compatibility/2006">
               <mc:Choice xmlns:v="urn:schemas-microsoft-com:vml" Requires="v">
-                <p:oleObj spid="_x0000_s15380" name="Document" r:id="rId3" imgW="6864119" imgH="3060634" progId="Word.Document.12">
+                <p:oleObj spid="_x0000_s15386" name="Document" r:id="rId3" imgW="6864119" imgH="3060634" progId="Word.Document.12">
                   <p:embed/>
                 </p:oleObj>
               </mc:Choice>
@@ -8856,7 +8842,7 @@
           <a:graphicData uri="http://schemas.openxmlformats.org/presentationml/2006/ole">
             <mc:AlternateContent xmlns:mc="http://schemas.openxmlformats.org/markup-compatibility/2006">
               <mc:Choice xmlns:v="urn:schemas-microsoft-com:vml" Requires="v">
-                <p:oleObj spid="_x0000_s16404" name="Document" r:id="rId3" imgW="6864119" imgH="4274570" progId="Word.Document.12">
+                <p:oleObj spid="_x0000_s16410" name="Document" r:id="rId3" imgW="6864119" imgH="4274570" progId="Word.Document.12">
                   <p:embed/>
                 </p:oleObj>
               </mc:Choice>
@@ -9053,7 +9039,7 @@
           <a:graphicData uri="http://schemas.openxmlformats.org/presentationml/2006/ole">
             <mc:AlternateContent xmlns:mc="http://schemas.openxmlformats.org/markup-compatibility/2006">
               <mc:Choice xmlns:v="urn:schemas-microsoft-com:vml" Requires="v">
-                <p:oleObj spid="_x0000_s17428" name="Document" r:id="rId3" imgW="6864119" imgH="5286484" progId="Word.Document.12">
+                <p:oleObj spid="_x0000_s17434" name="Document" r:id="rId3" imgW="6864119" imgH="5286484" progId="Word.Document.12">
                   <p:embed/>
                 </p:oleObj>
               </mc:Choice>
@@ -9250,7 +9236,7 @@
           <a:graphicData uri="http://schemas.openxmlformats.org/presentationml/2006/ole">
             <mc:AlternateContent xmlns:mc="http://schemas.openxmlformats.org/markup-compatibility/2006">
               <mc:Choice xmlns:v="urn:schemas-microsoft-com:vml" Requires="v">
-                <p:oleObj spid="_x0000_s18452" name="Document" r:id="rId3" imgW="7220116" imgH="4542970" progId="Word.Document.12">
+                <p:oleObj spid="_x0000_s18458" name="Document" r:id="rId3" imgW="7220116" imgH="4542970" progId="Word.Document.12">
                   <p:embed/>
                 </p:oleObj>
               </mc:Choice>
@@ -9366,8 +9352,21 @@
                   <a:srgbClr val="2D2DB9"/>
                 </a:solidFill>
               </a:rPr>
-              <a:t>Using Asynch Task</a:t>
-            </a:r>
+              <a:t>Using </a:t>
+            </a:r>
+            <a:r>
+              <a:rPr lang="en-US" sz="6600" dirty="0" err="1">
+                <a:solidFill>
+                  <a:srgbClr val="2D2DB9"/>
+                </a:solidFill>
+              </a:rPr>
+              <a:t>AsynchTask</a:t>
+            </a:r>
+            <a:endParaRPr lang="en-US" sz="6600" dirty="0">
+              <a:solidFill>
+                <a:srgbClr val="2D2DB9"/>
+              </a:solidFill>
+            </a:endParaRPr>
           </a:p>
         </p:txBody>
       </p:sp>
@@ -9533,7 +9532,7 @@
           <a:graphicData uri="http://schemas.openxmlformats.org/presentationml/2006/ole">
             <mc:AlternateContent xmlns:mc="http://schemas.openxmlformats.org/markup-compatibility/2006">
               <mc:Choice xmlns:v="urn:schemas-microsoft-com:vml" Requires="v">
-                <p:oleObj spid="_x0000_s19490" name="Document" r:id="rId3" imgW="6965729" imgH="801234" progId="Word.Document.12">
+                <p:oleObj spid="_x0000_s19502" name="Document" r:id="rId3" imgW="6965729" imgH="801234" progId="Word.Document.12">
                   <p:embed/>
                 </p:oleObj>
               </mc:Choice>
@@ -9590,7 +9589,7 @@
           <a:graphicData uri="http://schemas.openxmlformats.org/presentationml/2006/ole">
             <mc:AlternateContent xmlns:mc="http://schemas.openxmlformats.org/markup-compatibility/2006">
               <mc:Choice xmlns:v="urn:schemas-microsoft-com:vml" Requires="v">
-                <p:oleObj spid="_x0000_s19491" r:id="rId5" imgW="2961415" imgH="3075761" progId="Visio.Drawing.11">
+                <p:oleObj spid="_x0000_s19503" r:id="rId5" imgW="2961415" imgH="3075761" progId="Visio.Drawing.11">
                   <p:embed/>
                 </p:oleObj>
               </mc:Choice>
@@ -10249,7 +10248,15 @@
             <a:pPr marL="457200" indent="-457200"/>
             <a:r>
               <a:rPr lang="en-US" dirty="0"/>
-              <a:t>Types used by an asynchronous:</a:t>
+              <a:t>Types used by </a:t>
+            </a:r>
+            <a:r>
+              <a:rPr lang="en-US" dirty="0" err="1"/>
+              <a:t>AsyncTask</a:t>
+            </a:r>
+            <a:r>
+              <a:rPr lang="en-US" dirty="0"/>
+              <a:t>:</a:t>
             </a:r>
           </a:p>
           <a:p>
@@ -10455,7 +10462,7 @@
           <a:graphicData uri="http://schemas.openxmlformats.org/presentationml/2006/ole">
             <mc:AlternateContent xmlns:mc="http://schemas.openxmlformats.org/markup-compatibility/2006">
               <mc:Choice xmlns:v="urn:schemas-microsoft-com:vml" Requires="v">
-                <p:oleObj spid="_x0000_s23572" name="Document" r:id="rId3" imgW="8305800" imgH="4686300" progId="Word.Document.12">
+                <p:oleObj spid="_x0000_s23578" name="Document" r:id="rId3" imgW="8305800" imgH="4686300" progId="Word.Document.12">
                   <p:embed/>
                 </p:oleObj>
               </mc:Choice>
@@ -10571,13 +10578,13 @@
         </p:nvSpPr>
         <p:spPr>
           <a:xfrm>
-            <a:off x="330200" y="1282700"/>
-            <a:ext cx="8674100" cy="5194300"/>
+            <a:off x="147918" y="1282700"/>
+            <a:ext cx="8856382" cy="5194300"/>
           </a:xfrm>
         </p:spPr>
         <p:txBody>
           <a:bodyPr>
-            <a:normAutofit fontScale="70000" lnSpcReduction="20000"/>
+            <a:normAutofit fontScale="62500" lnSpcReduction="20000"/>
           </a:bodyPr>
           <a:lstStyle/>
           <a:p>
@@ -10586,47 +10593,79 @@
             </a:pPr>
             <a:r>
               <a:rPr lang="en-US" dirty="0"/>
-              <a:t> private class </a:t>
-            </a:r>
-            <a:r>
-              <a:rPr lang="en-US" dirty="0" err="1"/>
+              <a:t> </a:t>
+            </a:r>
+            <a:r>
+              <a:rPr lang="en-US" dirty="0">
+                <a:latin typeface="Courier" pitchFamily="2" charset="0"/>
+              </a:rPr>
+              <a:t>private class </a:t>
+            </a:r>
+            <a:r>
+              <a:rPr lang="en-US" dirty="0" err="1">
+                <a:latin typeface="Courier" pitchFamily="2" charset="0"/>
+              </a:rPr>
               <a:t>DownloadFilesTask</a:t>
             </a:r>
             <a:r>
-              <a:rPr lang="en-US" dirty="0"/>
+              <a:rPr lang="en-US" dirty="0">
+                <a:latin typeface="Courier" pitchFamily="2" charset="0"/>
+              </a:rPr>
               <a:t> extends </a:t>
             </a:r>
             <a:r>
-              <a:rPr lang="en-US" dirty="0" err="1"/>
+              <a:rPr lang="en-US" dirty="0" err="1">
+                <a:latin typeface="Courier" pitchFamily="2" charset="0"/>
+              </a:rPr>
               <a:t>AsyncTask</a:t>
             </a:r>
             <a:r>
-              <a:rPr lang="en-US" dirty="0"/>
+              <a:rPr lang="en-US" dirty="0">
+                <a:latin typeface="Courier" pitchFamily="2" charset="0"/>
+              </a:rPr>
               <a:t>&lt;URL, Integer, Long&gt; {</a:t>
             </a:r>
+            <a:br>
+              <a:rPr lang="en-US" dirty="0">
+                <a:latin typeface="Courier" pitchFamily="2" charset="0"/>
+              </a:rPr>
+            </a:br>
+            <a:endParaRPr lang="en-US" dirty="0">
+              <a:latin typeface="Courier" pitchFamily="2" charset="0"/>
+            </a:endParaRPr>
           </a:p>
           <a:p>
             <a:pPr marL="0" indent="0">
               <a:buNone/>
             </a:pPr>
             <a:r>
-              <a:rPr lang="en-US" dirty="0"/>
-              <a:t>     protected Long </a:t>
-            </a:r>
-            <a:r>
-              <a:rPr lang="en-US" dirty="0" err="1"/>
+              <a:rPr lang="en-US" dirty="0">
+                <a:latin typeface="Courier" pitchFamily="2" charset="0"/>
+              </a:rPr>
+              <a:t>  protected Long </a:t>
+            </a:r>
+            <a:r>
+              <a:rPr lang="en-US" dirty="0" err="1">
+                <a:latin typeface="Courier" pitchFamily="2" charset="0"/>
+              </a:rPr>
               <a:t>doInBackground</a:t>
             </a:r>
             <a:r>
-              <a:rPr lang="en-US" dirty="0"/>
+              <a:rPr lang="en-US" dirty="0">
+                <a:latin typeface="Courier" pitchFamily="2" charset="0"/>
+              </a:rPr>
               <a:t>(URL... </a:t>
             </a:r>
             <a:r>
-              <a:rPr lang="en-US" dirty="0" err="1"/>
+              <a:rPr lang="en-US" dirty="0" err="1">
+                <a:latin typeface="Courier" pitchFamily="2" charset="0"/>
+              </a:rPr>
               <a:t>urls</a:t>
             </a:r>
             <a:r>
-              <a:rPr lang="en-US" dirty="0"/>
+              <a:rPr lang="en-US" dirty="0">
+                <a:latin typeface="Courier" pitchFamily="2" charset="0"/>
+              </a:rPr>
               <a:t>) {</a:t>
             </a:r>
           </a:p>
@@ -10635,15 +10674,33 @@
               <a:buNone/>
             </a:pPr>
             <a:r>
-              <a:rPr lang="en-US" dirty="0"/>
-              <a:t>         int count = </a:t>
-            </a:r>
-            <a:r>
-              <a:rPr lang="en-US" dirty="0" err="1"/>
+              <a:rPr lang="en-US" dirty="0">
+                <a:latin typeface="Courier" pitchFamily="2" charset="0"/>
+              </a:rPr>
+              <a:t>    </a:t>
+            </a:r>
+            <a:r>
+              <a:rPr lang="en-US" dirty="0" err="1">
+                <a:latin typeface="Courier" pitchFamily="2" charset="0"/>
+              </a:rPr>
+              <a:t>int</a:t>
+            </a:r>
+            <a:r>
+              <a:rPr lang="en-US" dirty="0">
+                <a:latin typeface="Courier" pitchFamily="2" charset="0"/>
+              </a:rPr>
+              <a:t> count = </a:t>
+            </a:r>
+            <a:r>
+              <a:rPr lang="en-US" dirty="0" err="1">
+                <a:latin typeface="Courier" pitchFamily="2" charset="0"/>
+              </a:rPr>
               <a:t>urls.length</a:t>
             </a:r>
             <a:r>
-              <a:rPr lang="en-US" dirty="0"/>
+              <a:rPr lang="en-US" dirty="0">
+                <a:latin typeface="Courier" pitchFamily="2" charset="0"/>
+              </a:rPr>
               <a:t>;</a:t>
             </a:r>
           </a:p>
@@ -10652,15 +10709,21 @@
               <a:buNone/>
             </a:pPr>
             <a:r>
-              <a:rPr lang="en-US" dirty="0"/>
-              <a:t>         long </a:t>
-            </a:r>
-            <a:r>
-              <a:rPr lang="en-US" dirty="0" err="1"/>
+              <a:rPr lang="en-US" dirty="0">
+                <a:latin typeface="Courier" pitchFamily="2" charset="0"/>
+              </a:rPr>
+              <a:t>    long </a:t>
+            </a:r>
+            <a:r>
+              <a:rPr lang="en-US" dirty="0" err="1">
+                <a:latin typeface="Courier" pitchFamily="2" charset="0"/>
+              </a:rPr>
               <a:t>totalSize</a:t>
             </a:r>
             <a:r>
-              <a:rPr lang="en-US" dirty="0"/>
+              <a:rPr lang="en-US" dirty="0">
+                <a:latin typeface="Courier" pitchFamily="2" charset="0"/>
+              </a:rPr>
               <a:t> = 0;</a:t>
             </a:r>
           </a:p>
@@ -10669,31 +10732,45 @@
               <a:buNone/>
             </a:pPr>
             <a:r>
-              <a:rPr lang="en-US" dirty="0"/>
-              <a:t>         for (int </a:t>
-            </a:r>
-            <a:r>
-              <a:rPr lang="en-US" dirty="0" err="1"/>
+              <a:rPr lang="en-US" dirty="0">
+                <a:latin typeface="Courier" pitchFamily="2" charset="0"/>
+              </a:rPr>
+              <a:t>    for (int </a:t>
+            </a:r>
+            <a:r>
+              <a:rPr lang="en-US" dirty="0" err="1">
+                <a:latin typeface="Courier" pitchFamily="2" charset="0"/>
+              </a:rPr>
               <a:t>i</a:t>
             </a:r>
             <a:r>
-              <a:rPr lang="en-US" dirty="0"/>
+              <a:rPr lang="en-US" dirty="0">
+                <a:latin typeface="Courier" pitchFamily="2" charset="0"/>
+              </a:rPr>
               <a:t> = 0; </a:t>
             </a:r>
             <a:r>
-              <a:rPr lang="en-US" dirty="0" err="1"/>
+              <a:rPr lang="en-US" dirty="0" err="1">
+                <a:latin typeface="Courier" pitchFamily="2" charset="0"/>
+              </a:rPr>
               <a:t>i</a:t>
             </a:r>
             <a:r>
-              <a:rPr lang="en-US" dirty="0"/>
+              <a:rPr lang="en-US" dirty="0">
+                <a:latin typeface="Courier" pitchFamily="2" charset="0"/>
+              </a:rPr>
               <a:t> &lt; count; </a:t>
             </a:r>
             <a:r>
-              <a:rPr lang="en-US" dirty="0" err="1"/>
+              <a:rPr lang="en-US" dirty="0" err="1">
+                <a:latin typeface="Courier" pitchFamily="2" charset="0"/>
+              </a:rPr>
               <a:t>i</a:t>
             </a:r>
             <a:r>
-              <a:rPr lang="en-US" dirty="0"/>
+              <a:rPr lang="en-US" dirty="0">
+                <a:latin typeface="Courier" pitchFamily="2" charset="0"/>
+              </a:rPr>
               <a:t>++) {</a:t>
             </a:r>
           </a:p>
@@ -10702,39 +10779,57 @@
               <a:buNone/>
             </a:pPr>
             <a:r>
-              <a:rPr lang="en-US" dirty="0"/>
-              <a:t>             </a:t>
-            </a:r>
-            <a:r>
-              <a:rPr lang="en-US" dirty="0" err="1"/>
+              <a:rPr lang="en-US" dirty="0">
+                <a:latin typeface="Courier" pitchFamily="2" charset="0"/>
+              </a:rPr>
+              <a:t>      </a:t>
+            </a:r>
+            <a:r>
+              <a:rPr lang="en-US" dirty="0" err="1">
+                <a:latin typeface="Courier" pitchFamily="2" charset="0"/>
+              </a:rPr>
               <a:t>totalSize</a:t>
             </a:r>
             <a:r>
-              <a:rPr lang="en-US" dirty="0"/>
+              <a:rPr lang="en-US" dirty="0">
+                <a:latin typeface="Courier" pitchFamily="2" charset="0"/>
+              </a:rPr>
               <a:t> += </a:t>
             </a:r>
             <a:r>
-              <a:rPr lang="en-US" dirty="0" err="1"/>
+              <a:rPr lang="en-US" dirty="0" err="1">
+                <a:latin typeface="Courier" pitchFamily="2" charset="0"/>
+              </a:rPr>
               <a:t>Downloader.downloadFile</a:t>
             </a:r>
             <a:r>
-              <a:rPr lang="en-US" dirty="0"/>
+              <a:rPr lang="en-US" dirty="0">
+                <a:latin typeface="Courier" pitchFamily="2" charset="0"/>
+              </a:rPr>
               <a:t>(</a:t>
             </a:r>
             <a:r>
-              <a:rPr lang="en-US" dirty="0" err="1"/>
+              <a:rPr lang="en-US" dirty="0" err="1">
+                <a:latin typeface="Courier" pitchFamily="2" charset="0"/>
+              </a:rPr>
               <a:t>urls</a:t>
             </a:r>
             <a:r>
-              <a:rPr lang="en-US" dirty="0"/>
+              <a:rPr lang="en-US" dirty="0">
+                <a:latin typeface="Courier" pitchFamily="2" charset="0"/>
+              </a:rPr>
               <a:t>[</a:t>
             </a:r>
             <a:r>
-              <a:rPr lang="en-US" dirty="0" err="1"/>
+              <a:rPr lang="en-US" dirty="0" err="1">
+                <a:latin typeface="Courier" pitchFamily="2" charset="0"/>
+              </a:rPr>
               <a:t>i</a:t>
             </a:r>
             <a:r>
-              <a:rPr lang="en-US" dirty="0"/>
+              <a:rPr lang="en-US" dirty="0">
+                <a:latin typeface="Courier" pitchFamily="2" charset="0"/>
+              </a:rPr>
               <a:t>]);</a:t>
             </a:r>
           </a:p>
@@ -10743,24 +10838,46 @@
               <a:buNone/>
             </a:pPr>
             <a:r>
-              <a:rPr lang="en-US" dirty="0"/>
-              <a:t>             </a:t>
-            </a:r>
-            <a:r>
-              <a:rPr lang="en-US" dirty="0" err="1"/>
+              <a:rPr lang="en-US" dirty="0">
+                <a:latin typeface="Courier" pitchFamily="2" charset="0"/>
+              </a:rPr>
+              <a:t>      </a:t>
+            </a:r>
+            <a:r>
+              <a:rPr lang="en-US" dirty="0" err="1">
+                <a:latin typeface="Courier" pitchFamily="2" charset="0"/>
+              </a:rPr>
               <a:t>publishProgress</a:t>
             </a:r>
             <a:r>
-              <a:rPr lang="en-US" dirty="0"/>
-              <a:t>((int) ((</a:t>
-            </a:r>
-            <a:r>
-              <a:rPr lang="en-US" dirty="0" err="1"/>
+              <a:rPr lang="en-US" dirty="0">
+                <a:latin typeface="Courier" pitchFamily="2" charset="0"/>
+              </a:rPr>
+              <a:t>((</a:t>
+            </a:r>
+            <a:r>
+              <a:rPr lang="en-US" dirty="0" err="1">
+                <a:latin typeface="Courier" pitchFamily="2" charset="0"/>
+              </a:rPr>
+              <a:t>int</a:t>
+            </a:r>
+            <a:r>
+              <a:rPr lang="en-US" dirty="0">
+                <a:latin typeface="Courier" pitchFamily="2" charset="0"/>
+              </a:rPr>
+              <a:t>)((</a:t>
+            </a:r>
+            <a:r>
+              <a:rPr lang="en-US" dirty="0" err="1">
+                <a:latin typeface="Courier" pitchFamily="2" charset="0"/>
+              </a:rPr>
               <a:t>i</a:t>
             </a:r>
             <a:r>
-              <a:rPr lang="en-US" dirty="0"/>
-              <a:t> / (float) count) * 100));</a:t>
+              <a:rPr lang="en-US" dirty="0">
+                <a:latin typeface="Courier" pitchFamily="2" charset="0"/>
+              </a:rPr>
+              <a:t> / (float)count) * 100));</a:t>
             </a:r>
           </a:p>
           <a:p>
@@ -10768,8 +10885,10 @@
               <a:buNone/>
             </a:pPr>
             <a:r>
-              <a:rPr lang="en-US" dirty="0"/>
-              <a:t>             // Escape early if cancel() is called</a:t>
+              <a:rPr lang="en-US" dirty="0">
+                <a:latin typeface="Courier" pitchFamily="2" charset="0"/>
+              </a:rPr>
+              <a:t>      // Escape early if cancel() is called</a:t>
             </a:r>
           </a:p>
           <a:p>
@@ -10777,15 +10896,21 @@
               <a:buNone/>
             </a:pPr>
             <a:r>
-              <a:rPr lang="en-US" dirty="0"/>
-              <a:t>             if (</a:t>
-            </a:r>
-            <a:r>
-              <a:rPr lang="en-US" dirty="0" err="1"/>
+              <a:rPr lang="en-US" dirty="0">
+                <a:latin typeface="Courier" pitchFamily="2" charset="0"/>
+              </a:rPr>
+              <a:t>      if (</a:t>
+            </a:r>
+            <a:r>
+              <a:rPr lang="en-US" dirty="0" err="1">
+                <a:latin typeface="Courier" pitchFamily="2" charset="0"/>
+              </a:rPr>
               <a:t>isCancelled</a:t>
             </a:r>
             <a:r>
-              <a:rPr lang="en-US" dirty="0"/>
+              <a:rPr lang="en-US" dirty="0">
+                <a:latin typeface="Courier" pitchFamily="2" charset="0"/>
+              </a:rPr>
               <a:t>()) break;</a:t>
             </a:r>
           </a:p>
@@ -10794,8 +10919,10 @@
               <a:buNone/>
             </a:pPr>
             <a:r>
-              <a:rPr lang="en-US" dirty="0"/>
-              <a:t>         }</a:t>
+              <a:rPr lang="en-US" dirty="0">
+                <a:latin typeface="Courier" pitchFamily="2" charset="0"/>
+              </a:rPr>
+              <a:t>      }</a:t>
             </a:r>
           </a:p>
           <a:p>
@@ -10803,15 +10930,21 @@
               <a:buNone/>
             </a:pPr>
             <a:r>
-              <a:rPr lang="en-US" dirty="0"/>
-              <a:t>         return </a:t>
-            </a:r>
-            <a:r>
-              <a:rPr lang="en-US" dirty="0" err="1"/>
+              <a:rPr lang="en-US" dirty="0">
+                <a:latin typeface="Courier" pitchFamily="2" charset="0"/>
+              </a:rPr>
+              <a:t>      return </a:t>
+            </a:r>
+            <a:r>
+              <a:rPr lang="en-US" dirty="0" err="1">
+                <a:latin typeface="Courier" pitchFamily="2" charset="0"/>
+              </a:rPr>
               <a:t>totalSize</a:t>
             </a:r>
             <a:r>
-              <a:rPr lang="en-US" dirty="0"/>
+              <a:rPr lang="en-US" dirty="0">
+                <a:latin typeface="Courier" pitchFamily="2" charset="0"/>
+              </a:rPr>
               <a:t>;</a:t>
             </a:r>
           </a:p>
@@ -10820,9 +10953,14 @@
               <a:buNone/>
             </a:pPr>
             <a:r>
-              <a:rPr lang="en-US" dirty="0"/>
-              <a:t>     }</a:t>
-            </a:r>
+              <a:rPr lang="en-US">
+                <a:latin typeface="Courier" pitchFamily="2" charset="0"/>
+              </a:rPr>
+              <a:t>  }</a:t>
+            </a:r>
+            <a:endParaRPr lang="en-US" dirty="0">
+              <a:latin typeface="Courier" pitchFamily="2" charset="0"/>
+            </a:endParaRPr>
           </a:p>
           <a:p>
             <a:pPr marL="0" indent="0">
@@ -10937,62 +11075,21 @@
             <p:ph idx="1"/>
           </p:nvPr>
         </p:nvSpPr>
-        <p:spPr/>
+        <p:spPr>
+          <a:xfrm>
+            <a:off x="242047" y="1600200"/>
+            <a:ext cx="8794377" cy="4525963"/>
+          </a:xfrm>
+        </p:spPr>
         <p:txBody>
           <a:bodyPr>
-            <a:normAutofit fontScale="85000" lnSpcReduction="10000"/>
+            <a:normAutofit fontScale="62500" lnSpcReduction="20000"/>
           </a:bodyPr>
           <a:lstStyle/>
           <a:p>
-            <a:pPr marL="0" indent="0">
-              <a:buNone/>
-            </a:pPr>
             <a:r>
               <a:rPr lang="en-US" dirty="0"/>
-              <a:t>// continued from the previous slide</a:t>
-            </a:r>
-          </a:p>
-          <a:p>
-            <a:pPr marL="0" indent="0">
-              <a:buNone/>
-            </a:pPr>
-            <a:r>
-              <a:rPr lang="en-US" dirty="0"/>
-              <a:t>     protected void </a:t>
-            </a:r>
-            <a:r>
-              <a:rPr lang="en-US" dirty="0" err="1"/>
-              <a:t>onProgressUpdate</a:t>
-            </a:r>
-            <a:r>
-              <a:rPr lang="en-US" dirty="0"/>
-              <a:t>(Integer... progress) {</a:t>
-            </a:r>
-          </a:p>
-          <a:p>
-            <a:pPr marL="0" indent="0">
-              <a:buNone/>
-            </a:pPr>
-            <a:r>
-              <a:rPr lang="en-US" dirty="0"/>
-              <a:t>         </a:t>
-            </a:r>
-            <a:r>
-              <a:rPr lang="en-US" dirty="0" err="1"/>
-              <a:t>setProgressPercent</a:t>
-            </a:r>
-            <a:r>
-              <a:rPr lang="en-US" dirty="0"/>
-              <a:t>(progress[0]);</a:t>
-            </a:r>
-          </a:p>
-          <a:p>
-            <a:pPr marL="0" indent="0">
-              <a:buNone/>
-            </a:pPr>
-            <a:r>
-              <a:rPr lang="en-US" dirty="0"/>
-              <a:t>     }</a:t>
+              <a:t>continued from the previous slide</a:t>
             </a:r>
           </a:p>
           <a:p>
@@ -11006,16 +11103,22 @@
               <a:buNone/>
             </a:pPr>
             <a:r>
-              <a:rPr lang="en-US" dirty="0"/>
-              <a:t>     protected void </a:t>
-            </a:r>
-            <a:r>
-              <a:rPr lang="en-US" dirty="0" err="1"/>
-              <a:t>onPostExecute</a:t>
-            </a:r>
-            <a:r>
-              <a:rPr lang="en-US" dirty="0"/>
-              <a:t>(Long result) {</a:t>
+              <a:rPr lang="en-US" dirty="0">
+                <a:latin typeface="Courier" pitchFamily="2" charset="0"/>
+              </a:rPr>
+              <a:t>   protected void </a:t>
+            </a:r>
+            <a:r>
+              <a:rPr lang="en-US" dirty="0" err="1">
+                <a:latin typeface="Courier" pitchFamily="2" charset="0"/>
+              </a:rPr>
+              <a:t>onProgressUpdate</a:t>
+            </a:r>
+            <a:r>
+              <a:rPr lang="en-US" dirty="0">
+                <a:latin typeface="Courier" pitchFamily="2" charset="0"/>
+              </a:rPr>
+              <a:t>(Integer... progress){</a:t>
             </a:r>
           </a:p>
           <a:p>
@@ -11023,16 +11126,22 @@
               <a:buNone/>
             </a:pPr>
             <a:r>
-              <a:rPr lang="en-US" dirty="0"/>
-              <a:t>         </a:t>
-            </a:r>
-            <a:r>
-              <a:rPr lang="en-US" dirty="0" err="1"/>
-              <a:t>showDialog</a:t>
-            </a:r>
-            <a:r>
-              <a:rPr lang="en-US" dirty="0"/>
-              <a:t>("Downloaded " + result + " bytes");</a:t>
+              <a:rPr lang="en-US" dirty="0">
+                <a:latin typeface="Courier" pitchFamily="2" charset="0"/>
+              </a:rPr>
+              <a:t>        </a:t>
+            </a:r>
+            <a:r>
+              <a:rPr lang="en-US" dirty="0" err="1">
+                <a:latin typeface="Courier" pitchFamily="2" charset="0"/>
+              </a:rPr>
+              <a:t>setProgressPercent</a:t>
+            </a:r>
+            <a:r>
+              <a:rPr lang="en-US" dirty="0">
+                <a:latin typeface="Courier" pitchFamily="2" charset="0"/>
+              </a:rPr>
+              <a:t>(progress[0]);</a:t>
             </a:r>
           </a:p>
           <a:p>
@@ -11040,17 +11149,133 @@
               <a:buNone/>
             </a:pPr>
             <a:r>
-              <a:rPr lang="en-US" dirty="0"/>
-              <a:t>     }</a:t>
+              <a:rPr lang="en-US" dirty="0">
+                <a:latin typeface="Courier" pitchFamily="2" charset="0"/>
+              </a:rPr>
+              <a:t>   }</a:t>
             </a:r>
           </a:p>
           <a:p>
             <a:pPr marL="0" indent="0">
               <a:buNone/>
             </a:pPr>
+            <a:endParaRPr lang="en-US" dirty="0">
+              <a:latin typeface="Courier" pitchFamily="2" charset="0"/>
+            </a:endParaRPr>
+          </a:p>
+          <a:p>
+            <a:pPr marL="0" indent="0">
+              <a:buNone/>
+            </a:pPr>
+            <a:r>
+              <a:rPr lang="en-US" dirty="0">
+                <a:latin typeface="Courier" pitchFamily="2" charset="0"/>
+              </a:rPr>
+              <a:t>    protected void </a:t>
+            </a:r>
+            <a:r>
+              <a:rPr lang="en-US" dirty="0" err="1">
+                <a:latin typeface="Courier" pitchFamily="2" charset="0"/>
+              </a:rPr>
+              <a:t>onPostExecute</a:t>
+            </a:r>
+            <a:r>
+              <a:rPr lang="en-US" dirty="0">
+                <a:latin typeface="Courier" pitchFamily="2" charset="0"/>
+              </a:rPr>
+              <a:t>(Long result) {</a:t>
+            </a:r>
+          </a:p>
+          <a:p>
+            <a:pPr marL="0" indent="0">
+              <a:buNone/>
+            </a:pPr>
+            <a:r>
+              <a:rPr lang="en-US" dirty="0">
+                <a:latin typeface="Courier" pitchFamily="2" charset="0"/>
+              </a:rPr>
+              <a:t>        </a:t>
+            </a:r>
+            <a:r>
+              <a:rPr lang="en-US" dirty="0" err="1">
+                <a:latin typeface="Courier" pitchFamily="2" charset="0"/>
+              </a:rPr>
+              <a:t>showDialog</a:t>
+            </a:r>
+            <a:r>
+              <a:rPr lang="en-US" dirty="0">
+                <a:latin typeface="Courier" pitchFamily="2" charset="0"/>
+              </a:rPr>
+              <a:t>("Downloaded " + result + " bytes");</a:t>
+            </a:r>
+          </a:p>
+          <a:p>
+            <a:pPr marL="0" indent="0">
+              <a:buNone/>
+            </a:pPr>
+            <a:r>
+              <a:rPr lang="en-US" dirty="0">
+                <a:latin typeface="Courier" pitchFamily="2" charset="0"/>
+              </a:rPr>
+              <a:t>    }</a:t>
+            </a:r>
+          </a:p>
+          <a:p>
+            <a:pPr marL="0" indent="0">
+              <a:buNone/>
+            </a:pPr>
+            <a:r>
+              <a:rPr lang="en-US" dirty="0">
+                <a:latin typeface="Courier" pitchFamily="2" charset="0"/>
+              </a:rPr>
+              <a:t> }</a:t>
+            </a:r>
+          </a:p>
+          <a:p>
+            <a:pPr marL="0" indent="0">
+              <a:buNone/>
+            </a:pPr>
+            <a:endParaRPr lang="en-US" dirty="0"/>
+          </a:p>
+          <a:p>
             <a:r>
               <a:rPr lang="en-US" dirty="0"/>
-              <a:t> }</a:t>
+              <a:t>After an </a:t>
+            </a:r>
+            <a:r>
+              <a:rPr lang="en-US" dirty="0" err="1"/>
+              <a:t>AsyncTask</a:t>
+            </a:r>
+            <a:r>
+              <a:rPr lang="en-US" dirty="0"/>
+              <a:t> is instantiated, a task is executed like this:</a:t>
+            </a:r>
+          </a:p>
+          <a:p>
+            <a:pPr marL="0" indent="0">
+              <a:buNone/>
+            </a:pPr>
+            <a:r>
+              <a:rPr lang="en-US" dirty="0"/>
+              <a:t> </a:t>
+            </a:r>
+            <a:r>
+              <a:rPr lang="en-US" dirty="0">
+                <a:latin typeface="Courier" pitchFamily="2" charset="0"/>
+              </a:rPr>
+              <a:t>new </a:t>
+            </a:r>
+            <a:r>
+              <a:rPr lang="en-US" dirty="0" err="1">
+                <a:latin typeface="Courier" pitchFamily="2" charset="0"/>
+              </a:rPr>
+              <a:t>DownloadFilesTask</a:t>
+            </a:r>
+            <a:r>
+              <a:rPr lang="en-US" dirty="0">
+                <a:latin typeface="Courier" pitchFamily="2" charset="0"/>
+              </a:rPr>
+              <a:t>().execute(url1, url2, url3);</a:t>
             </a:r>
           </a:p>
         </p:txBody>
@@ -11365,7 +11590,7 @@
           <a:graphicData uri="http://schemas.openxmlformats.org/presentationml/2006/ole">
             <mc:AlternateContent xmlns:mc="http://schemas.openxmlformats.org/markup-compatibility/2006">
               <mc:Choice xmlns:v="urn:schemas-microsoft-com:vml" Requires="v">
-                <p:oleObj spid="_x0000_s20499" name="Document" r:id="rId3" imgW="6864119" imgH="4844200" progId="Word.Document.12">
+                <p:oleObj spid="_x0000_s20505" name="Document" r:id="rId3" imgW="6864119" imgH="4844200" progId="Word.Document.12">
                   <p:embed/>
                 </p:oleObj>
               </mc:Choice>
@@ -11562,7 +11787,7 @@
           <a:graphicData uri="http://schemas.openxmlformats.org/presentationml/2006/ole">
             <mc:AlternateContent xmlns:mc="http://schemas.openxmlformats.org/markup-compatibility/2006">
               <mc:Choice xmlns:v="urn:schemas-microsoft-com:vml" Requires="v">
-                <p:oleObj spid="_x0000_s21523" name="Document" r:id="rId3" imgW="6864119" imgH="4844200" progId="Word.Document.12">
+                <p:oleObj spid="_x0000_s21529" name="Document" r:id="rId3" imgW="6864119" imgH="4844200" progId="Word.Document.12">
                   <p:embed/>
                 </p:oleObj>
               </mc:Choice>
@@ -11759,7 +11984,7 @@
           <a:graphicData uri="http://schemas.openxmlformats.org/presentationml/2006/ole">
             <mc:AlternateContent xmlns:mc="http://schemas.openxmlformats.org/markup-compatibility/2006">
               <mc:Choice xmlns:v="urn:schemas-microsoft-com:vml" Requires="v">
-                <p:oleObj spid="_x0000_s22547" name="Document" r:id="rId3" imgW="7423337" imgH="5268807" progId="Word.Document.12">
+                <p:oleObj spid="_x0000_s22553" name="Document" r:id="rId3" imgW="7423337" imgH="5268807" progId="Word.Document.12">
                   <p:embed/>
                 </p:oleObj>
               </mc:Choice>
@@ -12197,7 +12422,7 @@
           <a:graphicData uri="http://schemas.openxmlformats.org/presentationml/2006/ole">
             <mc:AlternateContent xmlns:mc="http://schemas.openxmlformats.org/markup-compatibility/2006">
               <mc:Choice xmlns:v="urn:schemas-microsoft-com:vml" Requires="v">
-                <p:oleObj spid="_x0000_s4117" name="Document" r:id="rId3" imgW="6858000" imgH="4089400" progId="Word.Document.12">
+                <p:oleObj spid="_x0000_s4123" name="Document" r:id="rId3" imgW="6858000" imgH="4089400" progId="Word.Document.12">
                   <p:embed/>
                 </p:oleObj>
               </mc:Choice>
@@ -12394,7 +12619,7 @@
           <a:graphicData uri="http://schemas.openxmlformats.org/presentationml/2006/ole">
             <mc:AlternateContent xmlns:mc="http://schemas.openxmlformats.org/markup-compatibility/2006">
               <mc:Choice xmlns:v="urn:schemas-microsoft-com:vml" Requires="v">
-                <p:oleObj spid="_x0000_s5141" name="Document" r:id="rId3" imgW="6864119" imgH="4687993" progId="Word.Document.12">
+                <p:oleObj spid="_x0000_s5147" name="Document" r:id="rId3" imgW="6864119" imgH="4687993" progId="Word.Document.12">
                   <p:embed/>
                 </p:oleObj>
               </mc:Choice>

</xml_diff>